<commit_message>
Changes to COMP3011 course materials
</commit_message>
<xml_diff>
--- a/work/store/comp3011/AndysCourseMaterials/Mar2014/ProgrammingForSCSSession2.pptx
+++ b/work/store/comp3011/AndysCourseMaterials/Mar2014/ProgrammingForSCSSession2.pptx
@@ -1406,7 +1406,7 @@
         <p:spPr>
           <a:xfrm>
             <a:off x="0" y="0"/>
-            <a:ext cx="9133920" cy="6847920"/>
+            <a:ext cx="9133560" cy="6847560"/>
           </a:xfrm>
           <a:prstGeom prst="rect">
             <a:avLst/>
@@ -1432,7 +1432,7 @@
         <p:spPr>
           <a:xfrm>
             <a:off x="685800" y="2130840"/>
-            <a:ext cx="7762320" cy="1459800"/>
+            <a:ext cx="7761960" cy="1459440"/>
           </a:xfrm>
           <a:prstGeom prst="rect">
             <a:avLst/>
@@ -1472,7 +1472,7 @@
         <p:spPr>
           <a:xfrm>
             <a:off x="1371600" y="3886560"/>
-            <a:ext cx="6390720" cy="1742400"/>
+            <a:ext cx="6390360" cy="1742040"/>
           </a:xfrm>
           <a:prstGeom prst="rect">
             <a:avLst/>
@@ -1578,7 +1578,7 @@
         <p:spPr>
           <a:xfrm>
             <a:off x="0" y="0"/>
-            <a:ext cx="9133920" cy="6847920"/>
+            <a:ext cx="9133560" cy="6847560"/>
           </a:xfrm>
           <a:prstGeom prst="rect">
             <a:avLst/>
@@ -1604,7 +1604,7 @@
         <p:spPr>
           <a:xfrm>
             <a:off x="133200" y="274680"/>
-            <a:ext cx="8219520" cy="441360"/>
+            <a:ext cx="8219160" cy="441000"/>
           </a:xfrm>
           <a:prstGeom prst="rect">
             <a:avLst/>
@@ -1644,7 +1644,7 @@
         <p:spPr>
           <a:xfrm>
             <a:off x="3448440" y="1993680"/>
-            <a:ext cx="2250720" cy="1196280"/>
+            <a:ext cx="2250360" cy="1195920"/>
           </a:xfrm>
           <a:prstGeom prst="rect">
             <a:avLst/>
@@ -1736,7 +1736,7 @@
         <p:spPr>
           <a:xfrm>
             <a:off x="1443240" y="4248000"/>
-            <a:ext cx="1432440" cy="827280"/>
+            <a:ext cx="1432080" cy="826920"/>
           </a:xfrm>
           <a:prstGeom prst="rect">
             <a:avLst/>
@@ -1778,7 +1778,7 @@
         <p:spPr>
           <a:xfrm>
             <a:off x="6401520" y="4212000"/>
-            <a:ext cx="1523880" cy="827280"/>
+            <a:ext cx="1523520" cy="826920"/>
           </a:xfrm>
           <a:prstGeom prst="rect">
             <a:avLst/>
@@ -1820,7 +1820,7 @@
         <p:spPr>
           <a:xfrm>
             <a:off x="1008000" y="4248000"/>
-            <a:ext cx="2302920" cy="2158920"/>
+            <a:ext cx="2302560" cy="2158560"/>
           </a:xfrm>
           <a:prstGeom prst="rect">
             <a:avLst/>
@@ -1843,7 +1843,7 @@
         <p:spPr>
           <a:xfrm>
             <a:off x="3893400" y="1116000"/>
-            <a:ext cx="1432440" cy="827280"/>
+            <a:ext cx="1432080" cy="826920"/>
           </a:xfrm>
           <a:prstGeom prst="rect">
             <a:avLst/>
@@ -1885,7 +1885,7 @@
         <p:spPr>
           <a:xfrm>
             <a:off x="6012000" y="4212000"/>
-            <a:ext cx="2302920" cy="2194920"/>
+            <a:ext cx="2302560" cy="2194560"/>
           </a:xfrm>
           <a:prstGeom prst="rect">
             <a:avLst/>
@@ -1908,7 +1908,7 @@
         <p:spPr>
           <a:xfrm>
             <a:off x="3420000" y="1044000"/>
-            <a:ext cx="2302920" cy="2194920"/>
+            <a:ext cx="2302560" cy="2194560"/>
           </a:xfrm>
           <a:prstGeom prst="rect">
             <a:avLst/>
@@ -1931,7 +1931,7 @@
         <p:spPr>
           <a:xfrm>
             <a:off x="1064880" y="5089680"/>
-            <a:ext cx="1497960" cy="1196280"/>
+            <a:ext cx="1497600" cy="1195920"/>
           </a:xfrm>
           <a:prstGeom prst="rect">
             <a:avLst/>
@@ -2007,7 +2007,7 @@
         <p:spPr>
           <a:xfrm>
             <a:off x="6104880" y="5089680"/>
-            <a:ext cx="1497960" cy="1196280"/>
+            <a:ext cx="1497600" cy="1195920"/>
           </a:xfrm>
           <a:prstGeom prst="rect">
             <a:avLst/>
@@ -2105,7 +2105,7 @@
         <p:spPr>
           <a:xfrm>
             <a:off x="1183680" y="1938960"/>
-            <a:ext cx="1587960" cy="601200"/>
+            <a:ext cx="1587600" cy="600840"/>
           </a:xfrm>
           <a:prstGeom prst="rect">
             <a:avLst/>
@@ -2142,7 +2142,7 @@
         <p:spPr>
           <a:xfrm>
             <a:off x="648000" y="3888000"/>
-            <a:ext cx="7918920" cy="2662920"/>
+            <a:ext cx="7918560" cy="2662560"/>
           </a:xfrm>
           <a:prstGeom prst="rect">
             <a:avLst/>
@@ -2153,8 +2153,8 @@
               <a:srgbClr val="808080"/>
             </a:solidFill>
             <a:custDash>
-              <a:ds d="-745832448000" sp="-745832448000"/>
-              <a:ds d="-745832448000" sp="-745832448000"/>
+              <a:ds d="-1137704960000" sp="100000"/>
+              <a:ds d="-1137704960000" sp="100000"/>
             </a:custDash>
             <a:round/>
           </a:ln>
@@ -2169,7 +2169,7 @@
         <p:spPr>
           <a:xfrm>
             <a:off x="684000" y="3888000"/>
-            <a:ext cx="2206440" cy="345240"/>
+            <a:ext cx="2206080" cy="344880"/>
           </a:xfrm>
           <a:prstGeom prst="rect">
             <a:avLst/>
@@ -2221,7 +2221,7 @@
         <p:spPr>
           <a:xfrm>
             <a:off x="4608000" y="3384000"/>
-            <a:ext cx="1302840" cy="458280"/>
+            <a:ext cx="1302480" cy="457920"/>
           </a:xfrm>
           <a:prstGeom prst="rect">
             <a:avLst/>
@@ -2251,7 +2251,7 @@
         <p:spPr>
           <a:xfrm>
             <a:off x="159120" y="862560"/>
-            <a:ext cx="3159000" cy="345240"/>
+            <a:ext cx="3158640" cy="344880"/>
           </a:xfrm>
           <a:prstGeom prst="rect">
             <a:avLst/>
@@ -2330,7 +2330,7 @@
         <p:spPr>
           <a:xfrm>
             <a:off x="0" y="0"/>
-            <a:ext cx="9133920" cy="6847920"/>
+            <a:ext cx="9133560" cy="6847560"/>
           </a:xfrm>
           <a:prstGeom prst="rect">
             <a:avLst/>
@@ -2356,7 +2356,7 @@
         <p:spPr>
           <a:xfrm>
             <a:off x="97200" y="274680"/>
-            <a:ext cx="8219520" cy="441360"/>
+            <a:ext cx="8219160" cy="441000"/>
           </a:xfrm>
           <a:prstGeom prst="rect">
             <a:avLst/>
@@ -2405,7 +2405,7 @@
         <p:spPr>
           <a:xfrm>
             <a:off x="3440520" y="1489680"/>
-            <a:ext cx="2302560" cy="1565280"/>
+            <a:ext cx="2302200" cy="1564920"/>
           </a:xfrm>
           <a:prstGeom prst="rect">
             <a:avLst/>
@@ -2540,7 +2540,7 @@
         <p:spPr>
           <a:xfrm>
             <a:off x="3579480" y="1008000"/>
-            <a:ext cx="1983960" cy="458280"/>
+            <a:ext cx="1983600" cy="457920"/>
           </a:xfrm>
           <a:prstGeom prst="rect">
             <a:avLst/>
@@ -2570,7 +2570,7 @@
         <p:spPr>
           <a:xfrm>
             <a:off x="3420000" y="936000"/>
-            <a:ext cx="2302920" cy="2158920"/>
+            <a:ext cx="2302560" cy="2158560"/>
           </a:xfrm>
           <a:prstGeom prst="rect">
             <a:avLst/>
@@ -2593,7 +2593,7 @@
         <p:spPr>
           <a:xfrm>
             <a:off x="158040" y="899280"/>
-            <a:ext cx="2374200" cy="345240"/>
+            <a:ext cx="2373840" cy="344880"/>
           </a:xfrm>
           <a:prstGeom prst="rect">
             <a:avLst/>
@@ -2623,7 +2623,7 @@
         <p:spPr>
           <a:xfrm>
             <a:off x="6323760" y="1086840"/>
-            <a:ext cx="1333440" cy="345240"/>
+            <a:ext cx="1333080" cy="344880"/>
           </a:xfrm>
           <a:prstGeom prst="rect">
             <a:avLst/>
@@ -2653,7 +2653,7 @@
         <p:spPr>
           <a:xfrm>
             <a:off x="6480000" y="2808000"/>
-            <a:ext cx="1298160" cy="345240"/>
+            <a:ext cx="1297800" cy="344880"/>
           </a:xfrm>
           <a:prstGeom prst="rect">
             <a:avLst/>
@@ -2776,7 +2776,7 @@
         <p:spPr>
           <a:xfrm>
             <a:off x="0" y="36000"/>
-            <a:ext cx="9133920" cy="6847920"/>
+            <a:ext cx="9133560" cy="6847560"/>
           </a:xfrm>
           <a:prstGeom prst="rect">
             <a:avLst/>
@@ -2802,7 +2802,7 @@
         <p:spPr>
           <a:xfrm>
             <a:off x="457200" y="274680"/>
-            <a:ext cx="8219520" cy="441360"/>
+            <a:ext cx="8219160" cy="441000"/>
           </a:xfrm>
           <a:prstGeom prst="rect">
             <a:avLst/>
@@ -2860,7 +2860,7 @@
         <p:spPr>
           <a:xfrm>
             <a:off x="3440520" y="1489680"/>
-            <a:ext cx="2302560" cy="1565280"/>
+            <a:ext cx="2302200" cy="1564920"/>
           </a:xfrm>
           <a:prstGeom prst="rect">
             <a:avLst/>
@@ -2995,7 +2995,7 @@
         <p:spPr>
           <a:xfrm>
             <a:off x="1577520" y="3888000"/>
-            <a:ext cx="1983960" cy="458280"/>
+            <a:ext cx="1983600" cy="457920"/>
           </a:xfrm>
           <a:prstGeom prst="rect">
             <a:avLst/>
@@ -3025,7 +3025,7 @@
         <p:spPr>
           <a:xfrm>
             <a:off x="5844960" y="3852000"/>
-            <a:ext cx="1983960" cy="458280"/>
+            <a:ext cx="1983600" cy="457920"/>
           </a:xfrm>
           <a:prstGeom prst="rect">
             <a:avLst/>
@@ -3055,7 +3055,7 @@
         <p:spPr>
           <a:xfrm>
             <a:off x="1078920" y="3888000"/>
-            <a:ext cx="3030840" cy="2406960"/>
+            <a:ext cx="3030480" cy="2406600"/>
           </a:xfrm>
           <a:prstGeom prst="rect">
             <a:avLst/>
@@ -3078,7 +3078,7 @@
         <p:spPr>
           <a:xfrm>
             <a:off x="3579480" y="1008000"/>
-            <a:ext cx="1983960" cy="458280"/>
+            <a:ext cx="1983600" cy="457920"/>
           </a:xfrm>
           <a:prstGeom prst="rect">
             <a:avLst/>
@@ -3108,7 +3108,7 @@
         <p:spPr>
           <a:xfrm>
             <a:off x="5289840" y="3852000"/>
-            <a:ext cx="3094200" cy="2442960"/>
+            <a:ext cx="3093840" cy="2442600"/>
           </a:xfrm>
           <a:prstGeom prst="rect">
             <a:avLst/>
@@ -3131,7 +3131,7 @@
         <p:spPr>
           <a:xfrm>
             <a:off x="3420000" y="936000"/>
-            <a:ext cx="2302920" cy="2158920"/>
+            <a:ext cx="2302560" cy="2158560"/>
           </a:xfrm>
           <a:prstGeom prst="rect">
             <a:avLst/>
@@ -3154,7 +3154,7 @@
         <p:spPr>
           <a:xfrm>
             <a:off x="1056960" y="4369680"/>
-            <a:ext cx="3075120" cy="1565280"/>
+            <a:ext cx="3074760" cy="1564920"/>
           </a:xfrm>
           <a:prstGeom prst="rect">
             <a:avLst/>
@@ -3289,7 +3289,7 @@
         <p:spPr>
           <a:xfrm>
             <a:off x="5302440" y="4369680"/>
-            <a:ext cx="3075120" cy="1565280"/>
+            <a:ext cx="3074760" cy="1564920"/>
           </a:xfrm>
           <a:prstGeom prst="rect">
             <a:avLst/>
@@ -3438,7 +3438,7 @@
         <p:spPr>
           <a:xfrm>
             <a:off x="1183680" y="1938960"/>
-            <a:ext cx="1395720" cy="345240"/>
+            <a:ext cx="1395360" cy="344880"/>
           </a:xfrm>
           <a:prstGeom prst="rect">
             <a:avLst/>
@@ -3468,7 +3468,7 @@
         <p:spPr>
           <a:xfrm>
             <a:off x="648000" y="3528000"/>
-            <a:ext cx="7918920" cy="3022920"/>
+            <a:ext cx="7918560" cy="3022560"/>
           </a:xfrm>
           <a:prstGeom prst="rect">
             <a:avLst/>
@@ -3479,8 +3479,8 @@
               <a:srgbClr val="808080"/>
             </a:solidFill>
             <a:custDash>
-              <a:ds d="-745832448000" sp="-745832448000"/>
-              <a:ds d="-745832448000" sp="-745832448000"/>
+              <a:ds d="-1137704960000" sp="100000"/>
+              <a:ds d="-1137704960000" sp="100000"/>
             </a:custDash>
             <a:round/>
           </a:ln>
@@ -3495,7 +3495,7 @@
         <p:spPr>
           <a:xfrm>
             <a:off x="684000" y="3528000"/>
-            <a:ext cx="2206440" cy="345240"/>
+            <a:ext cx="2206080" cy="344880"/>
           </a:xfrm>
           <a:prstGeom prst="rect">
             <a:avLst/>
@@ -3547,7 +3547,7 @@
         <p:spPr>
           <a:xfrm>
             <a:off x="5004000" y="3096000"/>
-            <a:ext cx="1302840" cy="458280"/>
+            <a:ext cx="1302480" cy="457920"/>
           </a:xfrm>
           <a:prstGeom prst="rect">
             <a:avLst/>
@@ -3626,7 +3626,7 @@
         <p:spPr>
           <a:xfrm>
             <a:off x="0" y="0"/>
-            <a:ext cx="9133920" cy="6847920"/>
+            <a:ext cx="9133560" cy="6847560"/>
           </a:xfrm>
           <a:prstGeom prst="rect">
             <a:avLst/>
@@ -3652,7 +3652,7 @@
         <p:spPr>
           <a:xfrm>
             <a:off x="457200" y="274680"/>
-            <a:ext cx="8219520" cy="441360"/>
+            <a:ext cx="8219160" cy="441000"/>
           </a:xfrm>
           <a:prstGeom prst="rect">
             <a:avLst/>
@@ -3710,7 +3710,7 @@
         <p:spPr>
           <a:xfrm>
             <a:off x="1577520" y="2016000"/>
-            <a:ext cx="1983960" cy="458280"/>
+            <a:ext cx="1983600" cy="457920"/>
           </a:xfrm>
           <a:prstGeom prst="rect">
             <a:avLst/>
@@ -3740,7 +3740,7 @@
         <p:spPr>
           <a:xfrm>
             <a:off x="5844960" y="1980000"/>
-            <a:ext cx="1983960" cy="458280"/>
+            <a:ext cx="1983600" cy="457920"/>
           </a:xfrm>
           <a:prstGeom prst="rect">
             <a:avLst/>
@@ -3770,7 +3770,7 @@
         <p:spPr>
           <a:xfrm>
             <a:off x="1078920" y="2016000"/>
-            <a:ext cx="3030840" cy="2406960"/>
+            <a:ext cx="3030480" cy="2406600"/>
           </a:xfrm>
           <a:prstGeom prst="rect">
             <a:avLst/>
@@ -3793,7 +3793,7 @@
         <p:spPr>
           <a:xfrm>
             <a:off x="5289840" y="1980000"/>
-            <a:ext cx="3094200" cy="2442960"/>
+            <a:ext cx="3093840" cy="2442600"/>
           </a:xfrm>
           <a:prstGeom prst="rect">
             <a:avLst/>
@@ -3816,7 +3816,7 @@
         <p:spPr>
           <a:xfrm>
             <a:off x="1056960" y="2497680"/>
-            <a:ext cx="3075120" cy="1565280"/>
+            <a:ext cx="3074760" cy="1564920"/>
           </a:xfrm>
           <a:prstGeom prst="rect">
             <a:avLst/>
@@ -3951,7 +3951,7 @@
         <p:spPr>
           <a:xfrm>
             <a:off x="5302440" y="2497680"/>
-            <a:ext cx="3075120" cy="1565280"/>
+            <a:ext cx="3074760" cy="1564920"/>
           </a:xfrm>
           <a:prstGeom prst="rect">
             <a:avLst/>
@@ -4078,7 +4078,7 @@
         <p:spPr>
           <a:xfrm>
             <a:off x="648000" y="1656000"/>
-            <a:ext cx="7918920" cy="3022920"/>
+            <a:ext cx="7918560" cy="3022560"/>
           </a:xfrm>
           <a:prstGeom prst="rect">
             <a:avLst/>
@@ -4089,8 +4089,8 @@
               <a:srgbClr val="808080"/>
             </a:solidFill>
             <a:custDash>
-              <a:ds d="-745832448000" sp="-745832448000"/>
-              <a:ds d="-745832448000" sp="-745832448000"/>
+              <a:ds d="-1137704960000" sp="100000"/>
+              <a:ds d="-1137704960000" sp="100000"/>
             </a:custDash>
             <a:round/>
           </a:ln>
@@ -4105,7 +4105,7 @@
         <p:spPr>
           <a:xfrm>
             <a:off x="684000" y="1656000"/>
-            <a:ext cx="2206440" cy="345240"/>
+            <a:ext cx="2206080" cy="344880"/>
           </a:xfrm>
           <a:prstGeom prst="rect">
             <a:avLst/>
@@ -4135,7 +4135,7 @@
         <p:spPr>
           <a:xfrm>
             <a:off x="366480" y="1119240"/>
-            <a:ext cx="2208240" cy="345240"/>
+            <a:ext cx="2207880" cy="344880"/>
           </a:xfrm>
           <a:prstGeom prst="rect">
             <a:avLst/>
@@ -4165,7 +4165,7 @@
         <p:spPr>
           <a:xfrm>
             <a:off x="4536000" y="1116000"/>
-            <a:ext cx="2208240" cy="345240"/>
+            <a:ext cx="2207880" cy="344880"/>
           </a:xfrm>
           <a:prstGeom prst="rect">
             <a:avLst/>
@@ -4288,7 +4288,7 @@
         <p:spPr>
           <a:xfrm>
             <a:off x="0" y="0"/>
-            <a:ext cx="9133920" cy="6847920"/>
+            <a:ext cx="9133560" cy="6847560"/>
           </a:xfrm>
           <a:prstGeom prst="rect">
             <a:avLst/>
@@ -4314,7 +4314,7 @@
         <p:spPr>
           <a:xfrm>
             <a:off x="72000" y="238680"/>
-            <a:ext cx="8926920" cy="441360"/>
+            <a:ext cx="8926560" cy="441000"/>
           </a:xfrm>
           <a:prstGeom prst="rect">
             <a:avLst/>
@@ -4354,7 +4354,7 @@
         <p:spPr>
           <a:xfrm>
             <a:off x="1577520" y="2016000"/>
-            <a:ext cx="1983960" cy="458280"/>
+            <a:ext cx="1983600" cy="457920"/>
           </a:xfrm>
           <a:prstGeom prst="rect">
             <a:avLst/>
@@ -4384,7 +4384,7 @@
         <p:spPr>
           <a:xfrm>
             <a:off x="5844960" y="1980000"/>
-            <a:ext cx="1983960" cy="458280"/>
+            <a:ext cx="1983600" cy="457920"/>
           </a:xfrm>
           <a:prstGeom prst="rect">
             <a:avLst/>
@@ -4414,7 +4414,7 @@
         <p:spPr>
           <a:xfrm>
             <a:off x="1078920" y="2016000"/>
-            <a:ext cx="3030840" cy="2406960"/>
+            <a:ext cx="3030480" cy="2406600"/>
           </a:xfrm>
           <a:prstGeom prst="rect">
             <a:avLst/>
@@ -4437,7 +4437,7 @@
         <p:spPr>
           <a:xfrm>
             <a:off x="5289840" y="1980000"/>
-            <a:ext cx="3094200" cy="2442960"/>
+            <a:ext cx="3093840" cy="2442600"/>
           </a:xfrm>
           <a:prstGeom prst="rect">
             <a:avLst/>
@@ -4460,7 +4460,7 @@
         <p:spPr>
           <a:xfrm>
             <a:off x="1056960" y="2497680"/>
-            <a:ext cx="3075120" cy="1565280"/>
+            <a:ext cx="3074760" cy="1564920"/>
           </a:xfrm>
           <a:prstGeom prst="rect">
             <a:avLst/>
@@ -4595,7 +4595,7 @@
         <p:spPr>
           <a:xfrm>
             <a:off x="5302440" y="2497680"/>
-            <a:ext cx="3075120" cy="1565280"/>
+            <a:ext cx="3074760" cy="1564920"/>
           </a:xfrm>
           <a:prstGeom prst="rect">
             <a:avLst/>
@@ -4722,7 +4722,7 @@
         <p:spPr>
           <a:xfrm>
             <a:off x="366480" y="1119240"/>
-            <a:ext cx="2208240" cy="345240"/>
+            <a:ext cx="2207880" cy="344880"/>
           </a:xfrm>
           <a:prstGeom prst="rect">
             <a:avLst/>
@@ -4752,7 +4752,7 @@
         <p:spPr>
           <a:xfrm>
             <a:off x="4536000" y="1116000"/>
-            <a:ext cx="2208240" cy="345240"/>
+            <a:ext cx="2207880" cy="344880"/>
           </a:xfrm>
           <a:prstGeom prst="rect">
             <a:avLst/>
@@ -4782,7 +4782,7 @@
         <p:spPr>
           <a:xfrm>
             <a:off x="1836000" y="5328000"/>
-            <a:ext cx="1107720" cy="857160"/>
+            <a:ext cx="1107360" cy="856800"/>
           </a:xfrm>
           <a:prstGeom prst="rect">
             <a:avLst/>
@@ -4838,7 +4838,7 @@
         <p:spPr>
           <a:xfrm>
             <a:off x="6480000" y="5544000"/>
-            <a:ext cx="879120" cy="345240"/>
+            <a:ext cx="878760" cy="344880"/>
           </a:xfrm>
           <a:prstGeom prst="rect">
             <a:avLst/>
@@ -4868,7 +4868,7 @@
         <p:spPr>
           <a:xfrm>
             <a:off x="756000" y="5040000"/>
-            <a:ext cx="1243440" cy="345240"/>
+            <a:ext cx="1243080" cy="344880"/>
           </a:xfrm>
           <a:prstGeom prst="rect">
             <a:avLst/>
@@ -4898,7 +4898,7 @@
         <p:spPr>
           <a:xfrm>
             <a:off x="5976000" y="5076000"/>
-            <a:ext cx="520920" cy="345240"/>
+            <a:ext cx="520560" cy="344880"/>
           </a:xfrm>
           <a:prstGeom prst="rect">
             <a:avLst/>
@@ -5021,7 +5021,7 @@
         <p:spPr>
           <a:xfrm>
             <a:off x="0" y="0"/>
-            <a:ext cx="9133920" cy="6847920"/>
+            <a:ext cx="9133560" cy="6847560"/>
           </a:xfrm>
           <a:prstGeom prst="rect">
             <a:avLst/>
@@ -5047,7 +5047,7 @@
         <p:spPr>
           <a:xfrm>
             <a:off x="648000" y="5004000"/>
-            <a:ext cx="7765560" cy="1577880"/>
+            <a:ext cx="7765200" cy="1577520"/>
           </a:xfrm>
           <a:prstGeom prst="rect">
             <a:avLst/>
@@ -5109,7 +5109,7 @@
         <p:spPr>
           <a:xfrm>
             <a:off x="3384000" y="2160000"/>
-            <a:ext cx="1842840" cy="2264040"/>
+            <a:ext cx="1842480" cy="2263680"/>
           </a:xfrm>
           <a:prstGeom prst="rect">
             <a:avLst/>
@@ -5128,7 +5128,7 @@
         <p:spPr>
           <a:xfrm>
             <a:off x="396000" y="216000"/>
-            <a:ext cx="4222440" cy="713880"/>
+            <a:ext cx="4222080" cy="713520"/>
           </a:xfrm>
           <a:prstGeom prst="rect">
             <a:avLst/>
@@ -5158,7 +5158,7 @@
         <p:spPr>
           <a:xfrm>
             <a:off x="463320" y="1021680"/>
-            <a:ext cx="8015400" cy="459000"/>
+            <a:ext cx="8015040" cy="458640"/>
           </a:xfrm>
           <a:prstGeom prst="rect">
             <a:avLst/>
@@ -5237,7 +5237,7 @@
         <p:spPr>
           <a:xfrm>
             <a:off x="0" y="0"/>
-            <a:ext cx="9133920" cy="6847920"/>
+            <a:ext cx="9133560" cy="6847560"/>
           </a:xfrm>
           <a:prstGeom prst="rect">
             <a:avLst/>
@@ -5263,7 +5263,7 @@
         <p:spPr>
           <a:xfrm>
             <a:off x="457200" y="274680"/>
-            <a:ext cx="8219520" cy="441360"/>
+            <a:ext cx="8219160" cy="441000"/>
           </a:xfrm>
           <a:prstGeom prst="rect">
             <a:avLst/>
@@ -5318,7 +5318,7 @@
         <p:spPr>
           <a:xfrm>
             <a:off x="2397960" y="1908360"/>
-            <a:ext cx="4493880" cy="3179520"/>
+            <a:ext cx="4493520" cy="3179160"/>
           </a:xfrm>
           <a:prstGeom prst="rect">
             <a:avLst/>
@@ -5337,7 +5337,7 @@
         <p:spPr>
           <a:xfrm>
             <a:off x="468000" y="972000"/>
-            <a:ext cx="3987720" cy="457920"/>
+            <a:ext cx="3987360" cy="457560"/>
           </a:xfrm>
           <a:prstGeom prst="rect">
             <a:avLst/>
@@ -5416,7 +5416,7 @@
         <p:spPr>
           <a:xfrm>
             <a:off x="0" y="0"/>
-            <a:ext cx="9133920" cy="6847920"/>
+            <a:ext cx="9133560" cy="6847560"/>
           </a:xfrm>
           <a:prstGeom prst="rect">
             <a:avLst/>
@@ -5442,7 +5442,7 @@
         <p:spPr>
           <a:xfrm>
             <a:off x="457200" y="274680"/>
-            <a:ext cx="8219520" cy="441360"/>
+            <a:ext cx="8219160" cy="441000"/>
           </a:xfrm>
           <a:prstGeom prst="rect">
             <a:avLst/>
@@ -5506,7 +5506,7 @@
         <p:spPr>
           <a:xfrm>
             <a:off x="1216800" y="1359000"/>
-            <a:ext cx="6856200" cy="5141880"/>
+            <a:ext cx="6855840" cy="5141520"/>
           </a:xfrm>
           <a:prstGeom prst="rect">
             <a:avLst/>
@@ -5525,7 +5525,7 @@
         <p:spPr>
           <a:xfrm>
             <a:off x="540000" y="828000"/>
-            <a:ext cx="2142360" cy="457920"/>
+            <a:ext cx="2142000" cy="457560"/>
           </a:xfrm>
           <a:prstGeom prst="rect">
             <a:avLst/>
@@ -5604,7 +5604,7 @@
         <p:spPr>
           <a:xfrm>
             <a:off x="0" y="0"/>
-            <a:ext cx="9133920" cy="6847920"/>
+            <a:ext cx="9133560" cy="6847560"/>
           </a:xfrm>
           <a:prstGeom prst="rect">
             <a:avLst/>
@@ -5630,7 +5630,7 @@
         <p:spPr>
           <a:xfrm>
             <a:off x="457200" y="274680"/>
-            <a:ext cx="8219520" cy="441360"/>
+            <a:ext cx="8219160" cy="441000"/>
           </a:xfrm>
           <a:prstGeom prst="rect">
             <a:avLst/>
@@ -5694,7 +5694,7 @@
         <p:spPr>
           <a:xfrm>
             <a:off x="2777040" y="2205000"/>
-            <a:ext cx="4268160" cy="3782160"/>
+            <a:ext cx="4267800" cy="3781800"/>
           </a:xfrm>
           <a:prstGeom prst="rect">
             <a:avLst/>
@@ -5713,7 +5713,7 @@
         <p:spPr>
           <a:xfrm>
             <a:off x="1332000" y="4536000"/>
-            <a:ext cx="1082160" cy="1368720"/>
+            <a:ext cx="1081800" cy="1368360"/>
           </a:xfrm>
           <a:prstGeom prst="rect">
             <a:avLst/>
@@ -5832,7 +5832,7 @@
         <p:spPr>
           <a:xfrm>
             <a:off x="422640" y="797040"/>
-            <a:ext cx="5181480" cy="455400"/>
+            <a:ext cx="5181120" cy="455040"/>
           </a:xfrm>
           <a:prstGeom prst="rect">
             <a:avLst/>
@@ -5862,7 +5862,7 @@
         <p:spPr>
           <a:xfrm>
             <a:off x="771120" y="1368000"/>
-            <a:ext cx="6590160" cy="459000"/>
+            <a:ext cx="6589800" cy="458640"/>
           </a:xfrm>
           <a:prstGeom prst="rect">
             <a:avLst/>
@@ -5941,7 +5941,7 @@
         <p:spPr>
           <a:xfrm>
             <a:off x="2880" y="2880"/>
-            <a:ext cx="9133920" cy="6847920"/>
+            <a:ext cx="9133560" cy="6847560"/>
           </a:xfrm>
           <a:prstGeom prst="rect">
             <a:avLst/>
@@ -5967,7 +5967,7 @@
         <p:spPr>
           <a:xfrm>
             <a:off x="457200" y="274680"/>
-            <a:ext cx="8219520" cy="1132920"/>
+            <a:ext cx="8219160" cy="1132560"/>
           </a:xfrm>
           <a:prstGeom prst="rect">
             <a:avLst/>
@@ -6022,7 +6022,7 @@
         <p:spPr>
           <a:xfrm>
             <a:off x="2052000" y="1800000"/>
-            <a:ext cx="5031720" cy="4239720"/>
+            <a:ext cx="5031360" cy="4239360"/>
           </a:xfrm>
           <a:prstGeom prst="rect">
             <a:avLst/>
@@ -6041,7 +6041,7 @@
         <p:spPr>
           <a:xfrm>
             <a:off x="252000" y="2029680"/>
-            <a:ext cx="1759680" cy="342000"/>
+            <a:ext cx="1759320" cy="341640"/>
           </a:xfrm>
           <a:prstGeom prst="rect">
             <a:avLst/>
@@ -6071,7 +6071,7 @@
         <p:spPr>
           <a:xfrm>
             <a:off x="360000" y="4248000"/>
-            <a:ext cx="1241640" cy="597960"/>
+            <a:ext cx="1241280" cy="597600"/>
           </a:xfrm>
           <a:prstGeom prst="rect">
             <a:avLst/>
@@ -6201,7 +6201,7 @@
         <p:spPr>
           <a:xfrm>
             <a:off x="0" y="0"/>
-            <a:ext cx="9133920" cy="6847920"/>
+            <a:ext cx="9133560" cy="6847560"/>
           </a:xfrm>
           <a:prstGeom prst="rect">
             <a:avLst/>
@@ -6227,7 +6227,7 @@
         <p:spPr>
           <a:xfrm>
             <a:off x="457200" y="274680"/>
-            <a:ext cx="8219520" cy="585360"/>
+            <a:ext cx="8219160" cy="585000"/>
           </a:xfrm>
           <a:prstGeom prst="rect">
             <a:avLst/>
@@ -6267,7 +6267,7 @@
         <p:spPr>
           <a:xfrm>
             <a:off x="480600" y="2176200"/>
-            <a:ext cx="8182800" cy="2719800"/>
+            <a:ext cx="8182440" cy="2719440"/>
           </a:xfrm>
           <a:prstGeom prst="rect">
             <a:avLst/>
@@ -6343,16 +6343,7 @@
                 </a:solidFill>
                 <a:latin typeface="Arial"/>
               </a:rPr>
-              <a:t>- We showed some examples of attempts to              improve programming languages</a:t>
-            </a:r>
-            <a:r>
-              <a:rPr lang="en-GB" sz="2800">
-                <a:solidFill>
-                  <a:srgbClr val="000000"/>
-                </a:solidFill>
-                <a:latin typeface="Arial"/>
-              </a:rPr>
-              <a:t>.</a:t>
+              <a:t>- We showed some examples of attempts to              improve programming languages.</a:t>
             </a:r>
             <a:endParaRPr/>
           </a:p>
@@ -6416,7 +6407,7 @@
         <p:spPr>
           <a:xfrm>
             <a:off x="6120" y="-32040"/>
-            <a:ext cx="9133920" cy="6847920"/>
+            <a:ext cx="9133560" cy="6847560"/>
           </a:xfrm>
           <a:prstGeom prst="rect">
             <a:avLst/>
@@ -6442,7 +6433,7 @@
         <p:spPr>
           <a:xfrm>
             <a:off x="457200" y="202680"/>
-            <a:ext cx="8219520" cy="513360"/>
+            <a:ext cx="8219160" cy="513000"/>
           </a:xfrm>
           <a:prstGeom prst="rect">
             <a:avLst/>
@@ -6488,7 +6479,7 @@
         <p:spPr>
           <a:xfrm>
             <a:off x="864000" y="1296000"/>
-            <a:ext cx="7365240" cy="5012640"/>
+            <a:ext cx="7364880" cy="5012280"/>
           </a:xfrm>
           <a:prstGeom prst="rect">
             <a:avLst/>
@@ -6556,7 +6547,7 @@
         <p:spPr>
           <a:xfrm>
             <a:off x="0" y="0"/>
-            <a:ext cx="9133920" cy="6847920"/>
+            <a:ext cx="9133560" cy="6847560"/>
           </a:xfrm>
           <a:prstGeom prst="rect">
             <a:avLst/>
@@ -6582,7 +6573,7 @@
         <p:spPr>
           <a:xfrm>
             <a:off x="457200" y="274680"/>
-            <a:ext cx="8219520" cy="585360"/>
+            <a:ext cx="8219160" cy="585000"/>
           </a:xfrm>
           <a:prstGeom prst="rect">
             <a:avLst/>
@@ -6631,7 +6622,7 @@
         <p:spPr>
           <a:xfrm>
             <a:off x="720000" y="982440"/>
-            <a:ext cx="7698960" cy="5443560"/>
+            <a:ext cx="7698600" cy="5443200"/>
           </a:xfrm>
           <a:prstGeom prst="rect">
             <a:avLst/>
@@ -7290,7 +7281,7 @@
         <p:spPr>
           <a:xfrm>
             <a:off x="0" y="0"/>
-            <a:ext cx="9133920" cy="6847920"/>
+            <a:ext cx="9133560" cy="6847560"/>
           </a:xfrm>
           <a:prstGeom prst="rect">
             <a:avLst/>
@@ -7316,7 +7307,7 @@
         <p:spPr>
           <a:xfrm>
             <a:off x="864000" y="1691640"/>
-            <a:ext cx="7477560" cy="3774240"/>
+            <a:ext cx="7477200" cy="3773880"/>
           </a:xfrm>
           <a:prstGeom prst="rect">
             <a:avLst/>
@@ -7350,7 +7341,7 @@
         <p:spPr>
           <a:xfrm>
             <a:off x="468000" y="325080"/>
-            <a:ext cx="6766560" cy="544320"/>
+            <a:ext cx="6766200" cy="543960"/>
           </a:xfrm>
           <a:prstGeom prst="rect">
             <a:avLst/>
@@ -7370,7 +7361,7 @@
         <p:spPr>
           <a:xfrm>
             <a:off x="1188000" y="2304000"/>
-            <a:ext cx="6622560" cy="3528000"/>
+            <a:ext cx="6622200" cy="3527640"/>
           </a:xfrm>
           <a:prstGeom prst="rect">
             <a:avLst/>
@@ -7473,7 +7464,7 @@
         <p:spPr>
           <a:xfrm>
             <a:off x="543960" y="418680"/>
-            <a:ext cx="8058600" cy="1112760"/>
+            <a:ext cx="8058240" cy="1112400"/>
           </a:xfrm>
           <a:prstGeom prst="rect">
             <a:avLst/>
@@ -7559,7 +7550,7 @@
         <p:spPr>
           <a:xfrm>
             <a:off x="0" y="10080"/>
-            <a:ext cx="9133920" cy="6847920"/>
+            <a:ext cx="9133560" cy="6847560"/>
           </a:xfrm>
           <a:prstGeom prst="rect">
             <a:avLst/>
@@ -7585,7 +7576,7 @@
         <p:spPr>
           <a:xfrm>
             <a:off x="864000" y="1691640"/>
-            <a:ext cx="7477560" cy="3774240"/>
+            <a:ext cx="7477200" cy="3773880"/>
           </a:xfrm>
           <a:prstGeom prst="rect">
             <a:avLst/>
@@ -7619,7 +7610,7 @@
         <p:spPr>
           <a:xfrm>
             <a:off x="226800" y="325080"/>
-            <a:ext cx="8688960" cy="544320"/>
+            <a:ext cx="8688600" cy="543960"/>
           </a:xfrm>
           <a:prstGeom prst="rect">
             <a:avLst/>
@@ -7640,11 +7631,11 @@
           </a:p>
           <a:p>
             <a:r>
-              <a:rPr lang="en-GB"/>
+              <a:rPr lang="en-GB" sz="4000"/>
               <a:t> </a:t>
             </a:r>
             <a:r>
-              <a:rPr lang="en-GB"/>
+              <a:rPr lang="en-GB" sz="3600"/>
               <a:t>From Event-B to a 'new' Target Language </a:t>
             </a:r>
             <a:endParaRPr/>
@@ -7665,8 +7656,8 @@
         </p:blipFill>
         <p:spPr>
           <a:xfrm>
-            <a:off x="2196000" y="1540440"/>
-            <a:ext cx="4750200" cy="4361760"/>
+            <a:off x="2196000" y="2044440"/>
+            <a:ext cx="4749840" cy="4361400"/>
           </a:xfrm>
           <a:prstGeom prst="rect">
             <a:avLst/>
@@ -7734,7 +7725,7 @@
         <p:spPr>
           <a:xfrm>
             <a:off x="0" y="0"/>
-            <a:ext cx="9133920" cy="6847920"/>
+            <a:ext cx="9133560" cy="6847560"/>
           </a:xfrm>
           <a:prstGeom prst="rect">
             <a:avLst/>
@@ -7760,7 +7751,7 @@
         <p:spPr>
           <a:xfrm>
             <a:off x="864000" y="1691640"/>
-            <a:ext cx="7477560" cy="3774240"/>
+            <a:ext cx="7477200" cy="3773880"/>
           </a:xfrm>
           <a:prstGeom prst="rect">
             <a:avLst/>
@@ -7794,7 +7785,7 @@
         <p:spPr>
           <a:xfrm>
             <a:off x="440640" y="325080"/>
-            <a:ext cx="6325920" cy="544320"/>
+            <a:ext cx="6325560" cy="543960"/>
           </a:xfrm>
           <a:prstGeom prst="rect">
             <a:avLst/>
@@ -7830,7 +7821,7 @@
         <p:spPr>
           <a:xfrm>
             <a:off x="2053080" y="1800000"/>
-            <a:ext cx="5036040" cy="3598200"/>
+            <a:ext cx="5035680" cy="3597840"/>
           </a:xfrm>
           <a:prstGeom prst="rect">
             <a:avLst/>
@@ -7898,7 +7889,7 @@
         <p:spPr>
           <a:xfrm>
             <a:off x="0" y="0"/>
-            <a:ext cx="9133920" cy="6847920"/>
+            <a:ext cx="9133560" cy="6847560"/>
           </a:xfrm>
           <a:prstGeom prst="rect">
             <a:avLst/>
@@ -7924,7 +7915,7 @@
         <p:spPr>
           <a:xfrm>
             <a:off x="864000" y="1691640"/>
-            <a:ext cx="7477560" cy="3774240"/>
+            <a:ext cx="7477200" cy="3773880"/>
           </a:xfrm>
           <a:prstGeom prst="rect">
             <a:avLst/>
@@ -7958,7 +7949,7 @@
         <p:spPr>
           <a:xfrm>
             <a:off x="440640" y="325080"/>
-            <a:ext cx="7738200" cy="544320"/>
+            <a:ext cx="7737840" cy="543960"/>
           </a:xfrm>
           <a:prstGeom prst="rect">
             <a:avLst/>
@@ -7994,7 +7985,7 @@
         <p:spPr>
           <a:xfrm>
             <a:off x="1476360" y="2016360"/>
-            <a:ext cx="6189840" cy="3957840"/>
+            <a:ext cx="6189480" cy="3957480"/>
           </a:xfrm>
           <a:prstGeom prst="rect">
             <a:avLst/>
@@ -8013,7 +8004,7 @@
         <p:spPr>
           <a:xfrm>
             <a:off x="388080" y="929160"/>
-            <a:ext cx="1962360" cy="458280"/>
+            <a:ext cx="1962000" cy="457920"/>
           </a:xfrm>
           <a:prstGeom prst="rect">
             <a:avLst/>
@@ -8092,7 +8083,7 @@
         <p:spPr>
           <a:xfrm>
             <a:off x="0" y="0"/>
-            <a:ext cx="9133920" cy="6847920"/>
+            <a:ext cx="9133560" cy="6847560"/>
           </a:xfrm>
           <a:prstGeom prst="rect">
             <a:avLst/>
@@ -8118,7 +8109,7 @@
         <p:spPr>
           <a:xfrm>
             <a:off x="864000" y="1691640"/>
-            <a:ext cx="7477560" cy="3774240"/>
+            <a:ext cx="7477200" cy="3773880"/>
           </a:xfrm>
           <a:prstGeom prst="rect">
             <a:avLst/>
@@ -8152,7 +8143,7 @@
         <p:spPr>
           <a:xfrm>
             <a:off x="440640" y="325080"/>
-            <a:ext cx="7738200" cy="544320"/>
+            <a:ext cx="7737840" cy="543960"/>
           </a:xfrm>
           <a:prstGeom prst="rect">
             <a:avLst/>
@@ -8192,7 +8183,7 @@
         <p:spPr>
           <a:xfrm>
             <a:off x="720000" y="1691640"/>
-            <a:ext cx="7271640" cy="4247640"/>
+            <a:ext cx="7271280" cy="4247280"/>
           </a:xfrm>
           <a:prstGeom prst="rect">
             <a:avLst/>
@@ -8259,8 +8250,8 @@
         </p:nvSpPr>
         <p:spPr>
           <a:xfrm>
-            <a:off x="0" y="0"/>
-            <a:ext cx="9133920" cy="6847920"/>
+            <a:off x="0" y="10440"/>
+            <a:ext cx="9133560" cy="6847560"/>
           </a:xfrm>
           <a:prstGeom prst="rect">
             <a:avLst/>
@@ -8285,8 +8276,8 @@
         </p:nvSpPr>
         <p:spPr>
           <a:xfrm>
-            <a:off x="720000" y="2556000"/>
-            <a:ext cx="7765560" cy="1577880"/>
+            <a:off x="720000" y="1836000"/>
+            <a:ext cx="7765200" cy="1577520"/>
           </a:xfrm>
           <a:prstGeom prst="rect">
             <a:avLst/>
@@ -8305,7 +8296,7 @@
                   <a:srgbClr val="000000"/>
                 </a:solidFill>
               </a:rPr>
-              <a:t>AutoTasks do not communicate with each other.</a:t>
+              <a:t>- AutoTasks do not communicate with each other.</a:t>
             </a:r>
             <a:endParaRPr/>
           </a:p>
@@ -8319,7 +8310,7 @@
                   <a:srgbClr val="000000"/>
                 </a:solidFill>
               </a:rPr>
-              <a:t>Communicate through Shared Machines.</a:t>
+              <a:t>- Communicate through Shared Machines.</a:t>
             </a:r>
             <a:endParaRPr/>
           </a:p>
@@ -8333,7 +8324,7 @@
                   <a:srgbClr val="000000"/>
                 </a:solidFill>
               </a:rPr>
-              <a:t>No nesting, in the Tasking Event-B syntax.</a:t>
+              <a:t>- No nesting, in the Tasking Event-B syntax.</a:t>
             </a:r>
             <a:endParaRPr/>
           </a:p>
@@ -8347,7 +8338,7 @@
                   <a:srgbClr val="000000"/>
                 </a:solidFill>
               </a:rPr>
-              <a:t>One machine per 'Object'.</a:t>
+              <a:t>- One machine per 'Object'.</a:t>
             </a:r>
             <a:endParaRPr/>
           </a:p>
@@ -8381,8 +8372,8 @@
         </p:nvSpPr>
         <p:spPr>
           <a:xfrm>
-            <a:off x="396000" y="216000"/>
-            <a:ext cx="4222440" cy="713880"/>
+            <a:off x="1368000" y="216000"/>
+            <a:ext cx="4222080" cy="713520"/>
           </a:xfrm>
           <a:prstGeom prst="rect">
             <a:avLst/>
@@ -8397,34 +8388,8 @@
           <a:p>
             <a:r>
               <a:rPr lang="en-GB" sz="4000"/>
-              <a:t>Tasking Event-B</a:t>
-            </a:r>
-            <a:endParaRPr/>
-          </a:p>
-        </p:txBody>
-      </p:sp>
-      <p:sp>
-        <p:nvSpPr>
-          <p:cNvPr id="198" name="CustomShape 4"/>
-          <p:cNvSpPr/>
-          <p:nvPr/>
-        </p:nvSpPr>
-        <p:spPr>
-          <a:xfrm>
-            <a:off x="463320" y="1381680"/>
-            <a:ext cx="1780560" cy="459000"/>
-          </a:xfrm>
-          <a:prstGeom prst="rect">
-            <a:avLst/>
-          </a:prstGeom>
-          <a:noFill/>
-          <a:ln>
-            <a:noFill/>
-          </a:ln>
-        </p:spPr>
-        <p:txBody>
-          <a:bodyPr bIns="45000" lIns="90000" rIns="90000" tIns="45000" wrap="none"/>
-          <a:p>
+              <a:t>Tasking Event-B - </a:t>
+            </a:r>
             <a:r>
               <a:rPr lang="en-GB" sz="2600"/>
               <a:t>restrictions</a:t>
@@ -8432,6 +8397,26 @@
             <a:endParaRPr/>
           </a:p>
         </p:txBody>
+      </p:sp>
+      <p:sp>
+        <p:nvSpPr>
+          <p:cNvPr id="198" name="CustomShape 4"/>
+          <p:cNvSpPr/>
+          <p:nvPr/>
+        </p:nvSpPr>
+        <p:spPr>
+          <a:xfrm>
+            <a:off x="463320" y="1381680"/>
+            <a:ext cx="1780200" cy="458640"/>
+          </a:xfrm>
+          <a:prstGeom prst="rect">
+            <a:avLst/>
+          </a:prstGeom>
+          <a:noFill/>
+          <a:ln>
+            <a:noFill/>
+          </a:ln>
+        </p:spPr>
       </p:sp>
     </p:spTree>
   </p:cSld>
@@ -8491,7 +8476,7 @@
         <p:spPr>
           <a:xfrm>
             <a:off x="0" y="3960"/>
-            <a:ext cx="9133920" cy="6847920"/>
+            <a:ext cx="9133560" cy="6847560"/>
           </a:xfrm>
           <a:prstGeom prst="rect">
             <a:avLst/>
@@ -8517,7 +8502,7 @@
         <p:spPr>
           <a:xfrm>
             <a:off x="457200" y="274680"/>
-            <a:ext cx="8219520" cy="1132920"/>
+            <a:ext cx="8219160" cy="1132560"/>
           </a:xfrm>
           <a:prstGeom prst="rect">
             <a:avLst/>
@@ -8557,7 +8542,7 @@
         <p:spPr>
           <a:xfrm>
             <a:off x="844560" y="1470600"/>
-            <a:ext cx="7594920" cy="4033440"/>
+            <a:ext cx="7594560" cy="4033080"/>
           </a:xfrm>
           <a:prstGeom prst="rect">
             <a:avLst/>
@@ -8801,7 +8786,7 @@
         <p:spPr>
           <a:xfrm>
             <a:off x="0" y="0"/>
-            <a:ext cx="9133920" cy="6847920"/>
+            <a:ext cx="9133560" cy="6847560"/>
           </a:xfrm>
           <a:prstGeom prst="rect">
             <a:avLst/>
@@ -8827,7 +8812,7 @@
         <p:spPr>
           <a:xfrm>
             <a:off x="457200" y="274680"/>
-            <a:ext cx="8219520" cy="1132920"/>
+            <a:ext cx="8219160" cy="1132560"/>
           </a:xfrm>
           <a:prstGeom prst="rect">
             <a:avLst/>
@@ -8876,7 +8861,7 @@
         <p:spPr>
           <a:xfrm>
             <a:off x="864000" y="1691640"/>
-            <a:ext cx="7477560" cy="3774240"/>
+            <a:ext cx="7477200" cy="3773880"/>
           </a:xfrm>
           <a:prstGeom prst="rect">
             <a:avLst/>
@@ -9101,7 +9086,7 @@
         <p:spPr>
           <a:xfrm>
             <a:off x="0" y="0"/>
-            <a:ext cx="9133920" cy="6847920"/>
+            <a:ext cx="9133560" cy="6847560"/>
           </a:xfrm>
           <a:prstGeom prst="rect">
             <a:avLst/>
@@ -9127,7 +9112,7 @@
         <p:spPr>
           <a:xfrm>
             <a:off x="457200" y="274680"/>
-            <a:ext cx="8219520" cy="585360"/>
+            <a:ext cx="8219160" cy="585000"/>
           </a:xfrm>
           <a:prstGeom prst="rect">
             <a:avLst/>
@@ -9167,7 +9152,7 @@
         <p:spPr>
           <a:xfrm>
             <a:off x="457200" y="1888200"/>
-            <a:ext cx="8219520" cy="3295800"/>
+            <a:ext cx="8219160" cy="3295440"/>
           </a:xfrm>
           <a:prstGeom prst="rect">
             <a:avLst/>
@@ -9437,7 +9422,7 @@
         <p:spPr>
           <a:xfrm>
             <a:off x="0" y="8280"/>
-            <a:ext cx="9133920" cy="6847920"/>
+            <a:ext cx="9133560" cy="6847560"/>
           </a:xfrm>
           <a:prstGeom prst="rect">
             <a:avLst/>
@@ -9463,7 +9448,7 @@
         <p:spPr>
           <a:xfrm>
             <a:off x="457200" y="274680"/>
-            <a:ext cx="8219520" cy="585360"/>
+            <a:ext cx="8219160" cy="585000"/>
           </a:xfrm>
           <a:prstGeom prst="rect">
             <a:avLst/>
@@ -9503,7 +9488,7 @@
         <p:spPr>
           <a:xfrm>
             <a:off x="720000" y="1008000"/>
-            <a:ext cx="7848000" cy="4515840"/>
+            <a:ext cx="7847640" cy="4515480"/>
           </a:xfrm>
           <a:prstGeom prst="rect">
             <a:avLst/>
@@ -9578,7 +9563,7 @@
                 </a:solidFill>
                 <a:latin typeface="Arial"/>
               </a:rPr>
-              <a:t>- But to produce source code, we need to add       'extra' information to Event-B.</a:t>
+              <a:t>-  To produce source code, we add 'extra'                information to Event-B.</a:t>
             </a:r>
             <a:endParaRPr/>
           </a:p>
@@ -9638,7 +9623,7 @@
                 </a:solidFill>
                 <a:latin typeface="Arial"/>
               </a:rPr>
-              <a:t>and we need to 'certify' the translator.</a:t>
+              <a:t>and, ideally, 'certify' the translator.</a:t>
             </a:r>
             <a:endParaRPr/>
           </a:p>
@@ -9727,7 +9712,7 @@
         <p:spPr>
           <a:xfrm>
             <a:off x="0" y="0"/>
-            <a:ext cx="9133920" cy="6847920"/>
+            <a:ext cx="9133560" cy="6847560"/>
           </a:xfrm>
           <a:prstGeom prst="rect">
             <a:avLst/>
@@ -9753,7 +9738,7 @@
         <p:spPr>
           <a:xfrm>
             <a:off x="972000" y="1195200"/>
-            <a:ext cx="6840000" cy="4965840"/>
+            <a:ext cx="6839640" cy="4965480"/>
           </a:xfrm>
           <a:prstGeom prst="rect">
             <a:avLst/>
@@ -10026,7 +10011,7 @@
         <p:spPr>
           <a:xfrm>
             <a:off x="457560" y="275040"/>
-            <a:ext cx="8219520" cy="585360"/>
+            <a:ext cx="8219160" cy="585000"/>
           </a:xfrm>
           <a:prstGeom prst="rect">
             <a:avLst/>
@@ -10115,7 +10100,7 @@
         <p:spPr>
           <a:xfrm>
             <a:off x="0" y="8280"/>
-            <a:ext cx="9133920" cy="6847920"/>
+            <a:ext cx="9133560" cy="6847560"/>
           </a:xfrm>
           <a:prstGeom prst="rect">
             <a:avLst/>
@@ -10141,7 +10126,7 @@
         <p:spPr>
           <a:xfrm>
             <a:off x="457200" y="274680"/>
-            <a:ext cx="8219520" cy="585360"/>
+            <a:ext cx="8219160" cy="585000"/>
           </a:xfrm>
           <a:prstGeom prst="rect">
             <a:avLst/>
@@ -10181,7 +10166,7 @@
         <p:spPr>
           <a:xfrm>
             <a:off x="457200" y="1024200"/>
-            <a:ext cx="8219520" cy="4515840"/>
+            <a:ext cx="8219160" cy="4515480"/>
           </a:xfrm>
           <a:prstGeom prst="rect">
             <a:avLst/>
@@ -10539,7 +10524,7 @@
         <p:spPr>
           <a:xfrm>
             <a:off x="0" y="0"/>
-            <a:ext cx="9133920" cy="6847920"/>
+            <a:ext cx="9133560" cy="6847560"/>
           </a:xfrm>
           <a:prstGeom prst="rect">
             <a:avLst/>
@@ -10565,7 +10550,7 @@
         <p:spPr>
           <a:xfrm>
             <a:off x="612000" y="274680"/>
-            <a:ext cx="7918200" cy="585360"/>
+            <a:ext cx="7917840" cy="585000"/>
           </a:xfrm>
           <a:prstGeom prst="rect">
             <a:avLst/>
@@ -10611,7 +10596,7 @@
         <p:spPr>
           <a:xfrm>
             <a:off x="1296000" y="1620000"/>
-            <a:ext cx="6478200" cy="4318200"/>
+            <a:ext cx="6477840" cy="4317840"/>
           </a:xfrm>
           <a:prstGeom prst="rect">
             <a:avLst/>
@@ -10679,7 +10664,7 @@
         <p:spPr>
           <a:xfrm>
             <a:off x="0" y="1800"/>
-            <a:ext cx="9133920" cy="6847920"/>
+            <a:ext cx="9133560" cy="6847560"/>
           </a:xfrm>
           <a:prstGeom prst="rect">
             <a:avLst/>
@@ -10705,7 +10690,7 @@
         <p:spPr>
           <a:xfrm>
             <a:off x="324000" y="94680"/>
-            <a:ext cx="8491680" cy="765360"/>
+            <a:ext cx="8491320" cy="765000"/>
           </a:xfrm>
           <a:prstGeom prst="rect">
             <a:avLst/>
@@ -10760,7 +10745,7 @@
         <p:spPr>
           <a:xfrm>
             <a:off x="2304000" y="2232000"/>
-            <a:ext cx="4667400" cy="3638520"/>
+            <a:ext cx="4667040" cy="3638160"/>
           </a:xfrm>
           <a:prstGeom prst="rect">
             <a:avLst/>
@@ -10779,7 +10764,7 @@
         <p:spPr>
           <a:xfrm>
             <a:off x="363240" y="908640"/>
-            <a:ext cx="4024440" cy="455040"/>
+            <a:ext cx="4024080" cy="454680"/>
           </a:xfrm>
           <a:prstGeom prst="rect">
             <a:avLst/>
@@ -10861,8 +10846,8 @@
         </p:nvSpPr>
         <p:spPr>
           <a:xfrm>
-            <a:off x="0" y="0"/>
-            <a:ext cx="9133920" cy="6847920"/>
+            <a:off x="10440" y="10440"/>
+            <a:ext cx="9133560" cy="6847560"/>
           </a:xfrm>
           <a:prstGeom prst="rect">
             <a:avLst/>
@@ -10888,7 +10873,7 @@
         <p:spPr>
           <a:xfrm>
             <a:off x="457200" y="274680"/>
-            <a:ext cx="8219520" cy="441360"/>
+            <a:ext cx="8219160" cy="441000"/>
           </a:xfrm>
           <a:prstGeom prst="rect">
             <a:avLst/>
@@ -10961,7 +10946,7 @@
         <p:spPr>
           <a:xfrm>
             <a:off x="1584000" y="1512000"/>
-            <a:ext cx="5760000" cy="4752000"/>
+            <a:ext cx="5759640" cy="4751640"/>
           </a:xfrm>
           <a:prstGeom prst="rect">
             <a:avLst/>
@@ -10973,41 +10958,29 @@
       </p:pic>
       <p:sp>
         <p:nvSpPr>
-          <p:cNvPr id="64" name="TextShape 3"/>
-          <p:cNvSpPr txBox="1"/>
+          <p:cNvPr id="64" name="CustomShape 3"/>
+          <p:cNvSpPr/>
           <p:nvPr/>
         </p:nvSpPr>
         <p:spPr>
           <a:xfrm>
             <a:off x="1152000" y="1296000"/>
-            <a:ext cx="1321920" cy="390960"/>
-          </a:xfrm>
-          <a:prstGeom prst="rect">
-            <a:avLst/>
-          </a:prstGeom>
+            <a:ext cx="1321560" cy="390600"/>
+          </a:xfrm>
+          <a:prstGeom prst="rect">
+            <a:avLst/>
+          </a:prstGeom>
+          <a:noFill/>
+          <a:ln>
+            <a:noFill/>
+          </a:ln>
         </p:spPr>
         <p:txBody>
           <a:bodyPr bIns="45000" lIns="90000" rIns="90000" tIns="45000" wrap="none"/>
           <a:p>
             <a:r>
               <a:rPr lang="en-GB"/>
-              <a:t>e = e</a:t>
-            </a:r>
-            <a:r>
-              <a:rPr lang="en-GB"/>
-              <a:t>a</a:t>
-            </a:r>
-            <a:r>
-              <a:rPr lang="en-GB"/>
-              <a:t> || e</a:t>
-            </a:r>
-            <a:r>
-              <a:rPr lang="en-GB"/>
-              <a:t>b</a:t>
-            </a:r>
-            <a:r>
-              <a:rPr lang="en-GB"/>
-              <a:t> </a:t>
+              <a:t>e = ea || eb </a:t>
             </a:r>
             <a:endParaRPr/>
           </a:p>

</xml_diff>